<commit_message>
more figures for talk
</commit_message>
<xml_diff>
--- a/docs/2023-11-07_lab_meeting.pptx
+++ b/docs/2023-11-07_lab_meeting.pptx
@@ -36,7 +36,7 @@
             <a:spLocks noGrp="1"/>
           </p:cNvSpPr>
           <p:nvPr>
-            <p:ph type="ftr" idx="2"/>
+            <p:ph type="ftr" idx="1"/>
           </p:nvPr>
         </p:nvSpPr>
         <p:spPr/>
@@ -56,14 +56,14 @@
             <a:spLocks noGrp="1"/>
           </p:cNvSpPr>
           <p:nvPr>
-            <p:ph type="sldNum" idx="3"/>
+            <p:ph type="sldNum" idx="2"/>
           </p:nvPr>
         </p:nvSpPr>
         <p:spPr/>
         <p:txBody>
           <a:bodyPr/>
           <a:p>
-            <a:fld id="{0DFA7926-1E8F-4906-A9A2-65BB8AA59DD5}" type="slidenum">
+            <a:fld id="{D9CB5AD0-311E-46EF-9D23-865ACBD5C570}" type="slidenum">
               <a:t>&lt;#&gt;</a:t>
             </a:fld>
           </a:p>
@@ -76,7 +76,7 @@
             <a:spLocks noGrp="1"/>
           </p:cNvSpPr>
           <p:nvPr>
-            <p:ph type="dt" idx="1"/>
+            <p:ph type="dt" idx="3"/>
           </p:nvPr>
         </p:nvSpPr>
         <p:spPr/>
@@ -125,7 +125,7 @@
         <p:spPr>
           <a:xfrm>
             <a:off x="504000" y="226080"/>
-            <a:ext cx="9071640" cy="946440"/>
+            <a:ext cx="9071280" cy="946080"/>
           </a:xfrm>
           <a:prstGeom prst="rect">
             <a:avLst/>
@@ -162,7 +162,7 @@
         <p:spPr>
           <a:xfrm>
             <a:off x="504000" y="1326600"/>
-            <a:ext cx="9071640" cy="1568160"/>
+            <a:ext cx="9071280" cy="1568160"/>
           </a:xfrm>
           <a:prstGeom prst="rect">
             <a:avLst/>
@@ -196,7 +196,7 @@
         <p:spPr>
           <a:xfrm>
             <a:off x="504000" y="3044160"/>
-            <a:ext cx="9071640" cy="1568160"/>
+            <a:ext cx="9071280" cy="1568160"/>
           </a:xfrm>
           <a:prstGeom prst="rect">
             <a:avLst/>
@@ -224,7 +224,7 @@
             <a:spLocks noGrp="1"/>
           </p:cNvSpPr>
           <p:nvPr>
-            <p:ph type="ftr" idx="2"/>
+            <p:ph type="ftr" idx="1"/>
           </p:nvPr>
         </p:nvSpPr>
         <p:spPr/>
@@ -244,14 +244,14 @@
             <a:spLocks noGrp="1"/>
           </p:cNvSpPr>
           <p:nvPr>
-            <p:ph type="sldNum" idx="3"/>
+            <p:ph type="sldNum" idx="2"/>
           </p:nvPr>
         </p:nvSpPr>
         <p:spPr/>
         <p:txBody>
           <a:bodyPr/>
           <a:p>
-            <a:fld id="{74AE20B4-8FDA-4A6D-B950-B05D53FF42B3}" type="slidenum">
+            <a:fld id="{B9A29EA7-4450-4B7C-B10F-0744CE6C275C}" type="slidenum">
               <a:t>&lt;#&gt;</a:t>
             </a:fld>
           </a:p>
@@ -264,7 +264,7 @@
             <a:spLocks noGrp="1"/>
           </p:cNvSpPr>
           <p:nvPr>
-            <p:ph type="dt" idx="1"/>
+            <p:ph type="dt" idx="3"/>
           </p:nvPr>
         </p:nvSpPr>
         <p:spPr/>
@@ -313,7 +313,7 @@
         <p:spPr>
           <a:xfrm>
             <a:off x="504000" y="226080"/>
-            <a:ext cx="9071640" cy="946440"/>
+            <a:ext cx="9071280" cy="946080"/>
           </a:xfrm>
           <a:prstGeom prst="rect">
             <a:avLst/>
@@ -350,7 +350,7 @@
         <p:spPr>
           <a:xfrm>
             <a:off x="504000" y="1326600"/>
-            <a:ext cx="4426920" cy="1568160"/>
+            <a:ext cx="4426560" cy="1568160"/>
           </a:xfrm>
           <a:prstGeom prst="rect">
             <a:avLst/>
@@ -383,8 +383,8 @@
         </p:nvSpPr>
         <p:spPr>
           <a:xfrm>
-            <a:off x="5152680" y="1326600"/>
-            <a:ext cx="4426920" cy="1568160"/>
+            <a:off x="5152320" y="1326600"/>
+            <a:ext cx="4426560" cy="1568160"/>
           </a:xfrm>
           <a:prstGeom prst="rect">
             <a:avLst/>
@@ -418,7 +418,7 @@
         <p:spPr>
           <a:xfrm>
             <a:off x="504000" y="3044160"/>
-            <a:ext cx="4426920" cy="1568160"/>
+            <a:ext cx="4426560" cy="1568160"/>
           </a:xfrm>
           <a:prstGeom prst="rect">
             <a:avLst/>
@@ -451,8 +451,8 @@
         </p:nvSpPr>
         <p:spPr>
           <a:xfrm>
-            <a:off x="5152680" y="3044160"/>
-            <a:ext cx="4426920" cy="1568160"/>
+            <a:off x="5152320" y="3044160"/>
+            <a:ext cx="4426560" cy="1568160"/>
           </a:xfrm>
           <a:prstGeom prst="rect">
             <a:avLst/>
@@ -480,7 +480,7 @@
             <a:spLocks noGrp="1"/>
           </p:cNvSpPr>
           <p:nvPr>
-            <p:ph type="ftr" idx="2"/>
+            <p:ph type="ftr" idx="1"/>
           </p:nvPr>
         </p:nvSpPr>
         <p:spPr/>
@@ -500,14 +500,14 @@
             <a:spLocks noGrp="1"/>
           </p:cNvSpPr>
           <p:nvPr>
-            <p:ph type="sldNum" idx="3"/>
+            <p:ph type="sldNum" idx="2"/>
           </p:nvPr>
         </p:nvSpPr>
         <p:spPr/>
         <p:txBody>
           <a:bodyPr/>
           <a:p>
-            <a:fld id="{0684C023-94CB-4D74-9AE3-D7BF13ED251D}" type="slidenum">
+            <a:fld id="{4E7FB209-06B3-4E5E-80E2-8DAF9BCF471E}" type="slidenum">
               <a:t>&lt;#&gt;</a:t>
             </a:fld>
           </a:p>
@@ -520,7 +520,7 @@
             <a:spLocks noGrp="1"/>
           </p:cNvSpPr>
           <p:nvPr>
-            <p:ph type="dt" idx="1"/>
+            <p:ph type="dt" idx="3"/>
           </p:nvPr>
         </p:nvSpPr>
         <p:spPr/>
@@ -569,7 +569,7 @@
         <p:spPr>
           <a:xfrm>
             <a:off x="504000" y="226080"/>
-            <a:ext cx="9071640" cy="946440"/>
+            <a:ext cx="9071280" cy="946080"/>
           </a:xfrm>
           <a:prstGeom prst="rect">
             <a:avLst/>
@@ -804,7 +804,7 @@
             <a:spLocks noGrp="1"/>
           </p:cNvSpPr>
           <p:nvPr>
-            <p:ph type="ftr" idx="2"/>
+            <p:ph type="ftr" idx="1"/>
           </p:nvPr>
         </p:nvSpPr>
         <p:spPr/>
@@ -824,14 +824,14 @@
             <a:spLocks noGrp="1"/>
           </p:cNvSpPr>
           <p:nvPr>
-            <p:ph type="sldNum" idx="3"/>
+            <p:ph type="sldNum" idx="2"/>
           </p:nvPr>
         </p:nvSpPr>
         <p:spPr/>
         <p:txBody>
           <a:bodyPr/>
           <a:p>
-            <a:fld id="{96A709C7-C962-4233-A76A-C288483306D5}" type="slidenum">
+            <a:fld id="{5E08CC58-BD25-4633-8D72-FDAE79388A80}" type="slidenum">
               <a:t>&lt;#&gt;</a:t>
             </a:fld>
           </a:p>
@@ -844,7 +844,7 @@
             <a:spLocks noGrp="1"/>
           </p:cNvSpPr>
           <p:nvPr>
-            <p:ph type="dt" idx="1"/>
+            <p:ph type="dt" idx="3"/>
           </p:nvPr>
         </p:nvSpPr>
         <p:spPr/>
@@ -893,7 +893,7 @@
         <p:spPr>
           <a:xfrm>
             <a:off x="504000" y="226080"/>
-            <a:ext cx="9071640" cy="946440"/>
+            <a:ext cx="9071280" cy="946080"/>
           </a:xfrm>
           <a:prstGeom prst="rect">
             <a:avLst/>
@@ -930,7 +930,7 @@
         <p:spPr>
           <a:xfrm>
             <a:off x="504000" y="1326600"/>
-            <a:ext cx="9071640" cy="3288240"/>
+            <a:ext cx="9071280" cy="3287880"/>
           </a:xfrm>
           <a:prstGeom prst="rect">
             <a:avLst/>
@@ -961,7 +961,7 @@
             <a:spLocks noGrp="1"/>
           </p:cNvSpPr>
           <p:nvPr>
-            <p:ph type="ftr" idx="2"/>
+            <p:ph type="ftr" idx="1"/>
           </p:nvPr>
         </p:nvSpPr>
         <p:spPr/>
@@ -981,14 +981,14 @@
             <a:spLocks noGrp="1"/>
           </p:cNvSpPr>
           <p:nvPr>
-            <p:ph type="sldNum" idx="3"/>
+            <p:ph type="sldNum" idx="2"/>
           </p:nvPr>
         </p:nvSpPr>
         <p:spPr/>
         <p:txBody>
           <a:bodyPr/>
           <a:p>
-            <a:fld id="{DAEC9CDE-4521-424D-98EE-164EC5DA8383}" type="slidenum">
+            <a:fld id="{C26F2BDE-822A-432B-847A-0AD2FC543832}" type="slidenum">
               <a:t>&lt;#&gt;</a:t>
             </a:fld>
           </a:p>
@@ -1001,7 +1001,7 @@
             <a:spLocks noGrp="1"/>
           </p:cNvSpPr>
           <p:nvPr>
-            <p:ph type="dt" idx="1"/>
+            <p:ph type="dt" idx="3"/>
           </p:nvPr>
         </p:nvSpPr>
         <p:spPr/>
@@ -1050,7 +1050,7 @@
         <p:spPr>
           <a:xfrm>
             <a:off x="504000" y="226080"/>
-            <a:ext cx="9071640" cy="946440"/>
+            <a:ext cx="9071280" cy="946080"/>
           </a:xfrm>
           <a:prstGeom prst="rect">
             <a:avLst/>
@@ -1087,7 +1087,7 @@
         <p:spPr>
           <a:xfrm>
             <a:off x="504000" y="1326600"/>
-            <a:ext cx="9071640" cy="3288240"/>
+            <a:ext cx="9071280" cy="3287880"/>
           </a:xfrm>
           <a:prstGeom prst="rect">
             <a:avLst/>
@@ -1115,7 +1115,7 @@
             <a:spLocks noGrp="1"/>
           </p:cNvSpPr>
           <p:nvPr>
-            <p:ph type="ftr" idx="2"/>
+            <p:ph type="ftr" idx="1"/>
           </p:nvPr>
         </p:nvSpPr>
         <p:spPr/>
@@ -1135,14 +1135,14 @@
             <a:spLocks noGrp="1"/>
           </p:cNvSpPr>
           <p:nvPr>
-            <p:ph type="sldNum" idx="3"/>
+            <p:ph type="sldNum" idx="2"/>
           </p:nvPr>
         </p:nvSpPr>
         <p:spPr/>
         <p:txBody>
           <a:bodyPr/>
           <a:p>
-            <a:fld id="{7F308ED0-344B-464C-8B43-70F03A80C6A1}" type="slidenum">
+            <a:fld id="{00930764-2B40-428C-8F7B-7314884A90B7}" type="slidenum">
               <a:t>&lt;#&gt;</a:t>
             </a:fld>
           </a:p>
@@ -1155,7 +1155,7 @@
             <a:spLocks noGrp="1"/>
           </p:cNvSpPr>
           <p:nvPr>
-            <p:ph type="dt" idx="1"/>
+            <p:ph type="dt" idx="3"/>
           </p:nvPr>
         </p:nvSpPr>
         <p:spPr/>
@@ -1204,7 +1204,7 @@
         <p:spPr>
           <a:xfrm>
             <a:off x="504000" y="226080"/>
-            <a:ext cx="9071640" cy="946440"/>
+            <a:ext cx="9071280" cy="946080"/>
           </a:xfrm>
           <a:prstGeom prst="rect">
             <a:avLst/>
@@ -1241,7 +1241,7 @@
         <p:spPr>
           <a:xfrm>
             <a:off x="504000" y="1326600"/>
-            <a:ext cx="4426920" cy="3288240"/>
+            <a:ext cx="4426560" cy="3287880"/>
           </a:xfrm>
           <a:prstGeom prst="rect">
             <a:avLst/>
@@ -1274,8 +1274,8 @@
         </p:nvSpPr>
         <p:spPr>
           <a:xfrm>
-            <a:off x="5152680" y="1326600"/>
-            <a:ext cx="4426920" cy="3288240"/>
+            <a:off x="5152320" y="1326600"/>
+            <a:ext cx="4426560" cy="3287880"/>
           </a:xfrm>
           <a:prstGeom prst="rect">
             <a:avLst/>
@@ -1303,7 +1303,7 @@
             <a:spLocks noGrp="1"/>
           </p:cNvSpPr>
           <p:nvPr>
-            <p:ph type="ftr" idx="2"/>
+            <p:ph type="ftr" idx="1"/>
           </p:nvPr>
         </p:nvSpPr>
         <p:spPr/>
@@ -1323,14 +1323,14 @@
             <a:spLocks noGrp="1"/>
           </p:cNvSpPr>
           <p:nvPr>
-            <p:ph type="sldNum" idx="3"/>
+            <p:ph type="sldNum" idx="2"/>
           </p:nvPr>
         </p:nvSpPr>
         <p:spPr/>
         <p:txBody>
           <a:bodyPr/>
           <a:p>
-            <a:fld id="{C41A64FE-028C-4AA5-92CA-E380FD5DA4BE}" type="slidenum">
+            <a:fld id="{E98DDB5E-076B-46A7-905B-8D565208DA8C}" type="slidenum">
               <a:t>&lt;#&gt;</a:t>
             </a:fld>
           </a:p>
@@ -1343,7 +1343,7 @@
             <a:spLocks noGrp="1"/>
           </p:cNvSpPr>
           <p:nvPr>
-            <p:ph type="dt" idx="1"/>
+            <p:ph type="dt" idx="3"/>
           </p:nvPr>
         </p:nvSpPr>
         <p:spPr/>
@@ -1392,7 +1392,7 @@
         <p:spPr>
           <a:xfrm>
             <a:off x="504000" y="226080"/>
-            <a:ext cx="9071640" cy="946440"/>
+            <a:ext cx="9071280" cy="946080"/>
           </a:xfrm>
           <a:prstGeom prst="rect">
             <a:avLst/>
@@ -1423,7 +1423,7 @@
             <a:spLocks noGrp="1"/>
           </p:cNvSpPr>
           <p:nvPr>
-            <p:ph type="ftr" idx="2"/>
+            <p:ph type="ftr" idx="1"/>
           </p:nvPr>
         </p:nvSpPr>
         <p:spPr/>
@@ -1443,14 +1443,14 @@
             <a:spLocks noGrp="1"/>
           </p:cNvSpPr>
           <p:nvPr>
-            <p:ph type="sldNum" idx="3"/>
+            <p:ph type="sldNum" idx="2"/>
           </p:nvPr>
         </p:nvSpPr>
         <p:spPr/>
         <p:txBody>
           <a:bodyPr/>
           <a:p>
-            <a:fld id="{8C0B9AA8-5F9D-40AF-8DB0-1C0BC21B9567}" type="slidenum">
+            <a:fld id="{0B42BE38-76C6-442F-BED0-F077930C9DB1}" type="slidenum">
               <a:t>&lt;#&gt;</a:t>
             </a:fld>
           </a:p>
@@ -1463,7 +1463,7 @@
             <a:spLocks noGrp="1"/>
           </p:cNvSpPr>
           <p:nvPr>
-            <p:ph type="dt" idx="1"/>
+            <p:ph type="dt" idx="3"/>
           </p:nvPr>
         </p:nvSpPr>
         <p:spPr/>
@@ -1512,7 +1512,7 @@
         <p:spPr>
           <a:xfrm>
             <a:off x="504000" y="226080"/>
-            <a:ext cx="9071640" cy="4388400"/>
+            <a:ext cx="9071280" cy="4386600"/>
           </a:xfrm>
           <a:prstGeom prst="rect">
             <a:avLst/>
@@ -1543,7 +1543,7 @@
             <a:spLocks noGrp="1"/>
           </p:cNvSpPr>
           <p:nvPr>
-            <p:ph type="ftr" idx="2"/>
+            <p:ph type="ftr" idx="1"/>
           </p:nvPr>
         </p:nvSpPr>
         <p:spPr/>
@@ -1563,14 +1563,14 @@
             <a:spLocks noGrp="1"/>
           </p:cNvSpPr>
           <p:nvPr>
-            <p:ph type="sldNum" idx="3"/>
+            <p:ph type="sldNum" idx="2"/>
           </p:nvPr>
         </p:nvSpPr>
         <p:spPr/>
         <p:txBody>
           <a:bodyPr/>
           <a:p>
-            <a:fld id="{1C829D2C-13CB-4ABD-8A01-7E41CEB8133D}" type="slidenum">
+            <a:fld id="{2B3DE28B-F139-4B69-8049-9C029358F037}" type="slidenum">
               <a:t>&lt;#&gt;</a:t>
             </a:fld>
           </a:p>
@@ -1583,7 +1583,7 @@
             <a:spLocks noGrp="1"/>
           </p:cNvSpPr>
           <p:nvPr>
-            <p:ph type="dt" idx="1"/>
+            <p:ph type="dt" idx="3"/>
           </p:nvPr>
         </p:nvSpPr>
         <p:spPr/>
@@ -1632,7 +1632,7 @@
         <p:spPr>
           <a:xfrm>
             <a:off x="504000" y="226080"/>
-            <a:ext cx="9071640" cy="946440"/>
+            <a:ext cx="9071280" cy="946080"/>
           </a:xfrm>
           <a:prstGeom prst="rect">
             <a:avLst/>
@@ -1669,7 +1669,7 @@
         <p:spPr>
           <a:xfrm>
             <a:off x="504000" y="1326600"/>
-            <a:ext cx="4426920" cy="1568160"/>
+            <a:ext cx="4426560" cy="1568160"/>
           </a:xfrm>
           <a:prstGeom prst="rect">
             <a:avLst/>
@@ -1702,8 +1702,8 @@
         </p:nvSpPr>
         <p:spPr>
           <a:xfrm>
-            <a:off x="5152680" y="1326600"/>
-            <a:ext cx="4426920" cy="3288240"/>
+            <a:off x="5152320" y="1326600"/>
+            <a:ext cx="4426560" cy="3287880"/>
           </a:xfrm>
           <a:prstGeom prst="rect">
             <a:avLst/>
@@ -1737,7 +1737,7 @@
         <p:spPr>
           <a:xfrm>
             <a:off x="504000" y="3044160"/>
-            <a:ext cx="4426920" cy="1568160"/>
+            <a:ext cx="4426560" cy="1568160"/>
           </a:xfrm>
           <a:prstGeom prst="rect">
             <a:avLst/>
@@ -1765,7 +1765,7 @@
             <a:spLocks noGrp="1"/>
           </p:cNvSpPr>
           <p:nvPr>
-            <p:ph type="ftr" idx="2"/>
+            <p:ph type="ftr" idx="1"/>
           </p:nvPr>
         </p:nvSpPr>
         <p:spPr/>
@@ -1785,14 +1785,14 @@
             <a:spLocks noGrp="1"/>
           </p:cNvSpPr>
           <p:nvPr>
-            <p:ph type="sldNum" idx="3"/>
+            <p:ph type="sldNum" idx="2"/>
           </p:nvPr>
         </p:nvSpPr>
         <p:spPr/>
         <p:txBody>
           <a:bodyPr/>
           <a:p>
-            <a:fld id="{91974F88-9423-4375-A9EC-4A3E3F005D0A}" type="slidenum">
+            <a:fld id="{DAE60466-916C-4B0D-ADE7-FEF3DA0437F4}" type="slidenum">
               <a:t>&lt;#&gt;</a:t>
             </a:fld>
           </a:p>
@@ -1805,7 +1805,7 @@
             <a:spLocks noGrp="1"/>
           </p:cNvSpPr>
           <p:nvPr>
-            <p:ph type="dt" idx="1"/>
+            <p:ph type="dt" idx="3"/>
           </p:nvPr>
         </p:nvSpPr>
         <p:spPr/>
@@ -1854,7 +1854,7 @@
         <p:spPr>
           <a:xfrm>
             <a:off x="504000" y="226080"/>
-            <a:ext cx="9071640" cy="946440"/>
+            <a:ext cx="9071280" cy="946080"/>
           </a:xfrm>
           <a:prstGeom prst="rect">
             <a:avLst/>
@@ -1891,7 +1891,7 @@
         <p:spPr>
           <a:xfrm>
             <a:off x="504000" y="1326600"/>
-            <a:ext cx="4426920" cy="3288240"/>
+            <a:ext cx="4426560" cy="3287880"/>
           </a:xfrm>
           <a:prstGeom prst="rect">
             <a:avLst/>
@@ -1924,8 +1924,8 @@
         </p:nvSpPr>
         <p:spPr>
           <a:xfrm>
-            <a:off x="5152680" y="1326600"/>
-            <a:ext cx="4426920" cy="1568160"/>
+            <a:off x="5152320" y="1326600"/>
+            <a:ext cx="4426560" cy="1568160"/>
           </a:xfrm>
           <a:prstGeom prst="rect">
             <a:avLst/>
@@ -1958,8 +1958,8 @@
         </p:nvSpPr>
         <p:spPr>
           <a:xfrm>
-            <a:off x="5152680" y="3044160"/>
-            <a:ext cx="4426920" cy="1568160"/>
+            <a:off x="5152320" y="3044160"/>
+            <a:ext cx="4426560" cy="1568160"/>
           </a:xfrm>
           <a:prstGeom prst="rect">
             <a:avLst/>
@@ -1987,7 +1987,7 @@
             <a:spLocks noGrp="1"/>
           </p:cNvSpPr>
           <p:nvPr>
-            <p:ph type="ftr" idx="2"/>
+            <p:ph type="ftr" idx="1"/>
           </p:nvPr>
         </p:nvSpPr>
         <p:spPr/>
@@ -2007,14 +2007,14 @@
             <a:spLocks noGrp="1"/>
           </p:cNvSpPr>
           <p:nvPr>
-            <p:ph type="sldNum" idx="3"/>
+            <p:ph type="sldNum" idx="2"/>
           </p:nvPr>
         </p:nvSpPr>
         <p:spPr/>
         <p:txBody>
           <a:bodyPr/>
           <a:p>
-            <a:fld id="{6FBB616F-2127-4736-89E7-D9549723CB9F}" type="slidenum">
+            <a:fld id="{1E8FE2FF-AC0F-4C50-84EB-74E357DF8341}" type="slidenum">
               <a:t>&lt;#&gt;</a:t>
             </a:fld>
           </a:p>
@@ -2027,7 +2027,7 @@
             <a:spLocks noGrp="1"/>
           </p:cNvSpPr>
           <p:nvPr>
-            <p:ph type="dt" idx="1"/>
+            <p:ph type="dt" idx="3"/>
           </p:nvPr>
         </p:nvSpPr>
         <p:spPr/>
@@ -2076,7 +2076,7 @@
         <p:spPr>
           <a:xfrm>
             <a:off x="504000" y="226080"/>
-            <a:ext cx="9071640" cy="946440"/>
+            <a:ext cx="9071280" cy="946080"/>
           </a:xfrm>
           <a:prstGeom prst="rect">
             <a:avLst/>
@@ -2113,7 +2113,7 @@
         <p:spPr>
           <a:xfrm>
             <a:off x="504000" y="1326600"/>
-            <a:ext cx="4426920" cy="1568160"/>
+            <a:ext cx="4426560" cy="1568160"/>
           </a:xfrm>
           <a:prstGeom prst="rect">
             <a:avLst/>
@@ -2146,8 +2146,8 @@
         </p:nvSpPr>
         <p:spPr>
           <a:xfrm>
-            <a:off x="5152680" y="1326600"/>
-            <a:ext cx="4426920" cy="1568160"/>
+            <a:off x="5152320" y="1326600"/>
+            <a:ext cx="4426560" cy="1568160"/>
           </a:xfrm>
           <a:prstGeom prst="rect">
             <a:avLst/>
@@ -2181,7 +2181,7 @@
         <p:spPr>
           <a:xfrm>
             <a:off x="504000" y="3044160"/>
-            <a:ext cx="9071640" cy="1568160"/>
+            <a:ext cx="9071280" cy="1568160"/>
           </a:xfrm>
           <a:prstGeom prst="rect">
             <a:avLst/>
@@ -2209,7 +2209,7 @@
             <a:spLocks noGrp="1"/>
           </p:cNvSpPr>
           <p:nvPr>
-            <p:ph type="ftr" idx="2"/>
+            <p:ph type="ftr" idx="1"/>
           </p:nvPr>
         </p:nvSpPr>
         <p:spPr/>
@@ -2229,14 +2229,14 @@
             <a:spLocks noGrp="1"/>
           </p:cNvSpPr>
           <p:nvPr>
-            <p:ph type="sldNum" idx="3"/>
+            <p:ph type="sldNum" idx="2"/>
           </p:nvPr>
         </p:nvSpPr>
         <p:spPr/>
         <p:txBody>
           <a:bodyPr/>
           <a:p>
-            <a:fld id="{4FB7FA1B-513F-4978-9C6C-16EE78E45F36}" type="slidenum">
+            <a:fld id="{A18CE417-E97A-482E-BAF2-F79B2847E808}" type="slidenum">
               <a:t>&lt;#&gt;</a:t>
             </a:fld>
           </a:p>
@@ -2249,7 +2249,7 @@
             <a:spLocks noGrp="1"/>
           </p:cNvSpPr>
           <p:nvPr>
-            <p:ph type="dt" idx="1"/>
+            <p:ph type="dt" idx="3"/>
           </p:nvPr>
         </p:nvSpPr>
         <p:spPr/>
@@ -2298,7 +2298,7 @@
         <p:spPr>
           <a:xfrm>
             <a:off x="504000" y="226080"/>
-            <a:ext cx="9071640" cy="946440"/>
+            <a:ext cx="9071280" cy="946080"/>
           </a:xfrm>
           <a:prstGeom prst="rect">
             <a:avLst/>
@@ -2313,58 +2313,13 @@
             <a:noAutofit/>
           </a:bodyPr>
           <a:p>
-            <a:pPr algn="ctr">
-              <a:buNone/>
-            </a:pPr>
-            <a:r>
-              <a:rPr b="0" lang="en-US" sz="4400" spc="-1" strike="noStrike">
+            <a:r>
+              <a:rPr b="0" lang="en-US" sz="1800" spc="-1" strike="noStrike">
                 <a:latin typeface="Arial"/>
               </a:rPr>
-              <a:t>Clic</a:t>
-            </a:r>
-            <a:r>
-              <a:rPr b="0" lang="en-US" sz="4400" spc="-1" strike="noStrike">
-                <a:latin typeface="Arial"/>
-              </a:rPr>
-              <a:t>k to </a:t>
-            </a:r>
-            <a:r>
-              <a:rPr b="0" lang="en-US" sz="4400" spc="-1" strike="noStrike">
-                <a:latin typeface="Arial"/>
-              </a:rPr>
-              <a:t>edit </a:t>
-            </a:r>
-            <a:r>
-              <a:rPr b="0" lang="en-US" sz="4400" spc="-1" strike="noStrike">
-                <a:latin typeface="Arial"/>
-              </a:rPr>
-              <a:t>the </a:t>
-            </a:r>
-            <a:r>
-              <a:rPr b="0" lang="en-US" sz="4400" spc="-1" strike="noStrike">
-                <a:latin typeface="Arial"/>
-              </a:rPr>
-              <a:t>title </a:t>
-            </a:r>
-            <a:r>
-              <a:rPr b="0" lang="en-US" sz="4400" spc="-1" strike="noStrike">
-                <a:latin typeface="Arial"/>
-              </a:rPr>
-              <a:t>text </a:t>
-            </a:r>
-            <a:r>
-              <a:rPr b="0" lang="en-US" sz="4400" spc="-1" strike="noStrike">
-                <a:latin typeface="Arial"/>
-              </a:rPr>
-              <a:t>form</a:t>
-            </a:r>
-            <a:r>
-              <a:rPr b="0" lang="en-US" sz="4400" spc="-1" strike="noStrike">
-                <a:latin typeface="Arial"/>
-              </a:rPr>
-              <a:t>at</a:t>
-            </a:r>
-            <a:endParaRPr b="0" lang="en-US" sz="4400" spc="-1" strike="noStrike">
+              <a:t>Click to edit the title text format</a:t>
+            </a:r>
+            <a:endParaRPr b="0" lang="en-US" sz="1800" spc="-1" strike="noStrike">
               <a:latin typeface="Arial"/>
             </a:endParaRPr>
           </a:p>
@@ -2383,7 +2338,7 @@
         <p:spPr>
           <a:xfrm>
             <a:off x="504000" y="1326600"/>
-            <a:ext cx="9071640" cy="3288240"/>
+            <a:ext cx="9071280" cy="3287880"/>
           </a:xfrm>
           <a:prstGeom prst="rect">
             <a:avLst/>
@@ -2410,12 +2365,12 @@
               <a:buChar char=""/>
             </a:pPr>
             <a:r>
-              <a:rPr b="0" lang="en-US" sz="3200" spc="-1" strike="noStrike">
+              <a:rPr b="0" lang="en-US" sz="1800" spc="-1" strike="noStrike">
                 <a:latin typeface="Arial"/>
               </a:rPr>
               <a:t>Click to edit the outline text format</a:t>
             </a:r>
-            <a:endParaRPr b="0" lang="en-US" sz="3200" spc="-1" strike="noStrike">
+            <a:endParaRPr b="0" lang="en-US" sz="1800" spc="-1" strike="noStrike">
               <a:latin typeface="Arial"/>
             </a:endParaRPr>
           </a:p>
@@ -2432,12 +2387,12 @@
               <a:buChar char=""/>
             </a:pPr>
             <a:r>
-              <a:rPr b="0" lang="en-US" sz="2800" spc="-1" strike="noStrike">
+              <a:rPr b="0" lang="en-US" sz="1800" spc="-1" strike="noStrike">
                 <a:latin typeface="Arial"/>
               </a:rPr>
               <a:t>Second Outline Level</a:t>
             </a:r>
-            <a:endParaRPr b="0" lang="en-US" sz="2800" spc="-1" strike="noStrike">
+            <a:endParaRPr b="0" lang="en-US" sz="1800" spc="-1" strike="noStrike">
               <a:latin typeface="Arial"/>
             </a:endParaRPr>
           </a:p>
@@ -2454,12 +2409,12 @@
               <a:buChar char=""/>
             </a:pPr>
             <a:r>
-              <a:rPr b="0" lang="en-US" sz="2400" spc="-1" strike="noStrike">
+              <a:rPr b="0" lang="en-US" sz="1800" spc="-1" strike="noStrike">
                 <a:latin typeface="Arial"/>
               </a:rPr>
               <a:t>Third Outline Level</a:t>
             </a:r>
-            <a:endParaRPr b="0" lang="en-US" sz="2400" spc="-1" strike="noStrike">
+            <a:endParaRPr b="0" lang="en-US" sz="1800" spc="-1" strike="noStrike">
               <a:latin typeface="Arial"/>
             </a:endParaRPr>
           </a:p>
@@ -2476,12 +2431,12 @@
               <a:buChar char=""/>
             </a:pPr>
             <a:r>
-              <a:rPr b="0" lang="en-US" sz="2000" spc="-1" strike="noStrike">
+              <a:rPr b="0" lang="en-US" sz="1800" spc="-1" strike="noStrike">
                 <a:latin typeface="Arial"/>
               </a:rPr>
               <a:t>Fourth Outline Level</a:t>
             </a:r>
-            <a:endParaRPr b="0" lang="en-US" sz="2000" spc="-1" strike="noStrike">
+            <a:endParaRPr b="0" lang="en-US" sz="1800" spc="-1" strike="noStrike">
               <a:latin typeface="Arial"/>
             </a:endParaRPr>
           </a:p>
@@ -2498,12 +2453,12 @@
               <a:buChar char=""/>
             </a:pPr>
             <a:r>
-              <a:rPr b="0" lang="en-US" sz="2000" spc="-1" strike="noStrike">
+              <a:rPr b="0" lang="en-US" sz="1800" spc="-1" strike="noStrike">
                 <a:latin typeface="Arial"/>
               </a:rPr>
               <a:t>Fifth Outline Level</a:t>
             </a:r>
-            <a:endParaRPr b="0" lang="en-US" sz="2000" spc="-1" strike="noStrike">
+            <a:endParaRPr b="0" lang="en-US" sz="1800" spc="-1" strike="noStrike">
               <a:latin typeface="Arial"/>
             </a:endParaRPr>
           </a:p>
@@ -2520,12 +2475,12 @@
               <a:buChar char=""/>
             </a:pPr>
             <a:r>
-              <a:rPr b="0" lang="en-US" sz="2000" spc="-1" strike="noStrike">
+              <a:rPr b="0" lang="en-US" sz="1800" spc="-1" strike="noStrike">
                 <a:latin typeface="Arial"/>
               </a:rPr>
               <a:t>Sixth Outline Level</a:t>
             </a:r>
-            <a:endParaRPr b="0" lang="en-US" sz="2000" spc="-1" strike="noStrike">
+            <a:endParaRPr b="0" lang="en-US" sz="1800" spc="-1" strike="noStrike">
               <a:latin typeface="Arial"/>
             </a:endParaRPr>
           </a:p>
@@ -2542,12 +2497,12 @@
               <a:buChar char=""/>
             </a:pPr>
             <a:r>
-              <a:rPr b="0" lang="en-US" sz="2000" spc="-1" strike="noStrike">
+              <a:rPr b="0" lang="en-US" sz="1800" spc="-1" strike="noStrike">
                 <a:latin typeface="Arial"/>
               </a:rPr>
               <a:t>Seventh Outline Level</a:t>
             </a:r>
-            <a:endParaRPr b="0" lang="en-US" sz="2000" spc="-1" strike="noStrike">
+            <a:endParaRPr b="0" lang="en-US" sz="1800" spc="-1" strike="noStrike">
               <a:latin typeface="Arial"/>
             </a:endParaRPr>
           </a:p>
@@ -2560,13 +2515,127 @@
             <a:spLocks noGrp="1"/>
           </p:cNvSpPr>
           <p:nvPr>
-            <p:ph type="dt" idx="1"/>
+            <p:ph type="ftr" idx="1"/>
+          </p:nvPr>
+        </p:nvSpPr>
+        <p:spPr>
+          <a:xfrm>
+            <a:off x="3447360" y="5165280"/>
+            <a:ext cx="3194640" cy="390240"/>
+          </a:xfrm>
+          <a:prstGeom prst="rect">
+            <a:avLst/>
+          </a:prstGeom>
+          <a:noFill/>
+          <a:ln w="0">
+            <a:noFill/>
+          </a:ln>
+        </p:spPr>
+        <p:txBody>
+          <a:bodyPr lIns="0" rIns="0" tIns="0" bIns="0" anchor="t">
+            <a:noAutofit/>
+          </a:bodyPr>
+          <a:lstStyle>
+            <a:lvl1pPr algn="ctr">
+              <a:lnSpc>
+                <a:spcPct val="100000"/>
+              </a:lnSpc>
+              <a:buNone/>
+              <a:defRPr b="0" lang="en-US" sz="1400" spc="-1" strike="noStrike">
+                <a:latin typeface="Times New Roman"/>
+              </a:defRPr>
+            </a:lvl1pPr>
+          </a:lstStyle>
+          <a:p>
+            <a:pPr algn="ctr">
+              <a:lnSpc>
+                <a:spcPct val="100000"/>
+              </a:lnSpc>
+              <a:buNone/>
+            </a:pPr>
+            <a:r>
+              <a:rPr b="0" lang="en-US" sz="1400" spc="-1" strike="noStrike">
+                <a:latin typeface="Times New Roman"/>
+              </a:rPr>
+              <a:t>&lt;footer&gt;</a:t>
+            </a:r>
+            <a:endParaRPr b="0" lang="en-US" sz="1400" spc="-1" strike="noStrike">
+              <a:latin typeface="Times New Roman"/>
+            </a:endParaRPr>
+          </a:p>
+        </p:txBody>
+      </p:sp>
+      <p:sp>
+        <p:nvSpPr>
+          <p:cNvPr id="3" name="PlaceHolder 4"/>
+          <p:cNvSpPr>
+            <a:spLocks noGrp="1"/>
+          </p:cNvSpPr>
+          <p:nvPr>
+            <p:ph type="sldNum" idx="2"/>
+          </p:nvPr>
+        </p:nvSpPr>
+        <p:spPr>
+          <a:xfrm>
+            <a:off x="7227360" y="5165280"/>
+            <a:ext cx="2347920" cy="390240"/>
+          </a:xfrm>
+          <a:prstGeom prst="rect">
+            <a:avLst/>
+          </a:prstGeom>
+          <a:noFill/>
+          <a:ln w="0">
+            <a:noFill/>
+          </a:ln>
+        </p:spPr>
+        <p:txBody>
+          <a:bodyPr lIns="0" rIns="0" tIns="0" bIns="0" anchor="t">
+            <a:noAutofit/>
+          </a:bodyPr>
+          <a:lstStyle>
+            <a:lvl1pPr algn="r">
+              <a:lnSpc>
+                <a:spcPct val="100000"/>
+              </a:lnSpc>
+              <a:buNone/>
+              <a:defRPr b="0" lang="en-US" sz="1400" spc="-1" strike="noStrike">
+                <a:latin typeface="Times New Roman"/>
+              </a:defRPr>
+            </a:lvl1pPr>
+          </a:lstStyle>
+          <a:p>
+            <a:pPr algn="r">
+              <a:lnSpc>
+                <a:spcPct val="100000"/>
+              </a:lnSpc>
+              <a:buNone/>
+            </a:pPr>
+            <a:fld id="{D9D92536-2108-4D59-B9A9-B61D513759C6}" type="slidenum">
+              <a:rPr b="0" lang="en-US" sz="1400" spc="-1" strike="noStrike">
+                <a:latin typeface="Times New Roman"/>
+              </a:rPr>
+              <a:t>&lt;number&gt;</a:t>
+            </a:fld>
+            <a:endParaRPr b="0" lang="en-US" sz="1400" spc="-1" strike="noStrike">
+              <a:latin typeface="Times New Roman"/>
+            </a:endParaRPr>
+          </a:p>
+        </p:txBody>
+      </p:sp>
+      <p:sp>
+        <p:nvSpPr>
+          <p:cNvPr id="4" name="PlaceHolder 5"/>
+          <p:cNvSpPr>
+            <a:spLocks noGrp="1"/>
+          </p:cNvSpPr>
+          <p:nvPr>
+            <p:ph type="dt" idx="3"/>
           </p:nvPr>
         </p:nvSpPr>
         <p:spPr>
           <a:xfrm>
             <a:off x="504000" y="5165280"/>
-            <a:ext cx="2348280" cy="390600"/>
+            <a:ext cx="2347920" cy="390240"/>
           </a:xfrm>
           <a:prstGeom prst="rect">
             <a:avLst/>
@@ -2594,108 +2663,6 @@
               </a:rPr>
               <a:t>&lt;date/time&gt;</a:t>
             </a:r>
-            <a:endParaRPr b="0" lang="en-US" sz="1400" spc="-1" strike="noStrike">
-              <a:latin typeface="Times New Roman"/>
-            </a:endParaRPr>
-          </a:p>
-        </p:txBody>
-      </p:sp>
-      <p:sp>
-        <p:nvSpPr>
-          <p:cNvPr id="3" name="PlaceHolder 4"/>
-          <p:cNvSpPr>
-            <a:spLocks noGrp="1"/>
-          </p:cNvSpPr>
-          <p:nvPr>
-            <p:ph type="ftr" idx="2"/>
-          </p:nvPr>
-        </p:nvSpPr>
-        <p:spPr>
-          <a:xfrm>
-            <a:off x="3447360" y="5165280"/>
-            <a:ext cx="3195000" cy="390600"/>
-          </a:xfrm>
-          <a:prstGeom prst="rect">
-            <a:avLst/>
-          </a:prstGeom>
-          <a:noFill/>
-          <a:ln w="0">
-            <a:noFill/>
-          </a:ln>
-        </p:spPr>
-        <p:txBody>
-          <a:bodyPr lIns="0" rIns="0" tIns="0" bIns="0" anchor="t">
-            <a:noAutofit/>
-          </a:bodyPr>
-          <a:lstStyle>
-            <a:lvl1pPr algn="ctr">
-              <a:buNone/>
-              <a:defRPr b="0" lang="en-US" sz="1400" spc="-1" strike="noStrike">
-                <a:latin typeface="Times New Roman"/>
-              </a:defRPr>
-            </a:lvl1pPr>
-          </a:lstStyle>
-          <a:p>
-            <a:pPr algn="ctr">
-              <a:buNone/>
-            </a:pPr>
-            <a:r>
-              <a:rPr b="0" lang="en-US" sz="1400" spc="-1" strike="noStrike">
-                <a:latin typeface="Times New Roman"/>
-              </a:rPr>
-              <a:t>&lt;footer&gt;</a:t>
-            </a:r>
-            <a:endParaRPr b="0" lang="en-US" sz="1400" spc="-1" strike="noStrike">
-              <a:latin typeface="Times New Roman"/>
-            </a:endParaRPr>
-          </a:p>
-        </p:txBody>
-      </p:sp>
-      <p:sp>
-        <p:nvSpPr>
-          <p:cNvPr id="4" name="PlaceHolder 5"/>
-          <p:cNvSpPr>
-            <a:spLocks noGrp="1"/>
-          </p:cNvSpPr>
-          <p:nvPr>
-            <p:ph type="sldNum" idx="3"/>
-          </p:nvPr>
-        </p:nvSpPr>
-        <p:spPr>
-          <a:xfrm>
-            <a:off x="7227360" y="5165280"/>
-            <a:ext cx="2348280" cy="390600"/>
-          </a:xfrm>
-          <a:prstGeom prst="rect">
-            <a:avLst/>
-          </a:prstGeom>
-          <a:noFill/>
-          <a:ln w="0">
-            <a:noFill/>
-          </a:ln>
-        </p:spPr>
-        <p:txBody>
-          <a:bodyPr lIns="0" rIns="0" tIns="0" bIns="0" anchor="t">
-            <a:noAutofit/>
-          </a:bodyPr>
-          <a:lstStyle>
-            <a:lvl1pPr algn="r">
-              <a:buNone/>
-              <a:defRPr b="0" lang="en-US" sz="1400" spc="-1" strike="noStrike">
-                <a:latin typeface="Times New Roman"/>
-              </a:defRPr>
-            </a:lvl1pPr>
-          </a:lstStyle>
-          <a:p>
-            <a:pPr algn="r">
-              <a:buNone/>
-            </a:pPr>
-            <a:fld id="{DD70D810-CB8A-4618-B162-785B02CB1A48}" type="slidenum">
-              <a:rPr b="0" lang="en-US" sz="1400" spc="-1" strike="noStrike">
-                <a:latin typeface="Times New Roman"/>
-              </a:rPr>
-              <a:t>&lt;number&gt;</a:t>
-            </a:fld>
             <a:endParaRPr b="0" lang="en-US" sz="1400" spc="-1" strike="noStrike">
               <a:latin typeface="Times New Roman"/>
             </a:endParaRPr>
@@ -2753,7 +2720,7 @@
         <p:spPr>
           <a:xfrm>
             <a:off x="5890320" y="436320"/>
-            <a:ext cx="1278720" cy="374400"/>
+            <a:ext cx="1278360" cy="374040"/>
           </a:xfrm>
           <a:prstGeom prst="rect">
             <a:avLst/>
@@ -2777,7 +2744,7 @@
         <p:spPr>
           <a:xfrm>
             <a:off x="5668200" y="756360"/>
-            <a:ext cx="4334040" cy="4839480"/>
+            <a:ext cx="4333680" cy="4839120"/>
           </a:xfrm>
           <a:prstGeom prst="rect">
             <a:avLst/>
@@ -2800,7 +2767,7 @@
         <p:spPr>
           <a:xfrm>
             <a:off x="0" y="-243720"/>
-            <a:ext cx="10058400" cy="1024200"/>
+            <a:ext cx="10058040" cy="1023840"/>
           </a:xfrm>
           <a:prstGeom prst="rect">
             <a:avLst/>
@@ -2816,6 +2783,9 @@
           </a:bodyPr>
           <a:p>
             <a:pPr algn="ctr">
+              <a:lnSpc>
+                <a:spcPct val="100000"/>
+              </a:lnSpc>
               <a:buNone/>
             </a:pPr>
             <a:r>
@@ -2833,41 +2803,53 @@
       <p:sp>
         <p:nvSpPr>
           <p:cNvPr id="44" name=""/>
-          <p:cNvSpPr txBox="1"/>
+          <p:cNvSpPr/>
           <p:nvPr/>
         </p:nvSpPr>
         <p:spPr>
           <a:xfrm>
-            <a:off x="258840" y="1126800"/>
-            <a:ext cx="2526120" cy="346320"/>
-          </a:xfrm>
-          <a:prstGeom prst="rect">
-            <a:avLst/>
-          </a:prstGeom>
-          <a:noFill/>
-          <a:ln w="0">
-            <a:noFill/>
-          </a:ln>
-        </p:spPr>
+            <a:off x="258840" y="1846800"/>
+            <a:ext cx="2525760" cy="345960"/>
+          </a:xfrm>
+          <a:prstGeom prst="rect">
+            <a:avLst/>
+          </a:prstGeom>
+          <a:noFill/>
+          <a:ln w="0">
+            <a:noFill/>
+          </a:ln>
+        </p:spPr>
+        <p:style>
+          <a:lnRef idx="0"/>
+          <a:fillRef idx="0"/>
+          <a:effectRef idx="0"/>
+          <a:fontRef idx="minor"/>
+        </p:style>
         <p:txBody>
           <a:bodyPr lIns="90000" rIns="90000" tIns="45000" bIns="45000" anchor="t">
             <a:noAutofit/>
           </a:bodyPr>
           <a:p>
-            <a:r>
-              <a:rPr b="0" lang="en-US" sz="1800" spc="-1" strike="noStrike">
+            <a:pPr>
+              <a:lnSpc>
+                <a:spcPct val="100000"/>
+              </a:lnSpc>
+              <a:buNone/>
+            </a:pPr>
+            <a:r>
+              <a:rPr b="0" lang="en-US" sz="1600" spc="-1" strike="noStrike">
                 <a:latin typeface="Arial"/>
               </a:rPr>
               <a:t>1. </a:t>
             </a:r>
             <a:r>
-              <a:rPr b="0" lang="en-US" sz="1800" spc="-1" strike="noStrike" u="sng">
+              <a:rPr b="0" lang="en-US" sz="1600" spc="-1" strike="noStrike" u="sng">
                 <a:uFillTx/>
                 <a:latin typeface="Arial"/>
               </a:rPr>
               <a:t>Identify Ag-high cells</a:t>
             </a:r>
-            <a:endParaRPr b="0" lang="en-US" sz="1800" spc="-1" strike="noStrike">
+            <a:endParaRPr b="0" lang="en-US" sz="1600" spc="-1" strike="noStrike">
               <a:latin typeface="Arial"/>
             </a:endParaRPr>
           </a:p>
@@ -2876,77 +2858,101 @@
       <p:sp>
         <p:nvSpPr>
           <p:cNvPr id="45" name=""/>
-          <p:cNvSpPr txBox="1"/>
+          <p:cNvSpPr/>
           <p:nvPr/>
         </p:nvSpPr>
         <p:spPr>
           <a:xfrm>
-            <a:off x="501120" y="2600280"/>
-            <a:ext cx="3480120" cy="316080"/>
-          </a:xfrm>
-          <a:prstGeom prst="rect">
-            <a:avLst/>
-          </a:prstGeom>
-          <a:noFill/>
-          <a:ln w="0">
-            <a:noFill/>
-          </a:ln>
-        </p:spPr>
+            <a:off x="501120" y="3320280"/>
+            <a:ext cx="3479760" cy="315720"/>
+          </a:xfrm>
+          <a:prstGeom prst="rect">
+            <a:avLst/>
+          </a:prstGeom>
+          <a:noFill/>
+          <a:ln w="0">
+            <a:noFill/>
+          </a:ln>
+        </p:spPr>
+        <p:style>
+          <a:lnRef idx="0"/>
+          <a:fillRef idx="0"/>
+          <a:effectRef idx="0"/>
+          <a:fontRef idx="minor"/>
+        </p:style>
         <p:txBody>
           <a:bodyPr lIns="90000" rIns="90000" tIns="45000" bIns="45000" anchor="t">
             <a:noAutofit/>
           </a:bodyPr>
           <a:p>
+            <a:pPr>
+              <a:lnSpc>
+                <a:spcPct val="100000"/>
+              </a:lnSpc>
+              <a:buNone/>
+            </a:pPr>
+            <a:r>
+              <a:rPr b="0" lang="en-US" sz="1400" spc="-1" strike="noStrike">
+                <a:latin typeface="Arial"/>
+              </a:rPr>
+              <a:t>Split cells into training/testing groups</a:t>
+            </a:r>
+            <a:endParaRPr b="0" lang="en-US" sz="1400" spc="-1" strike="noStrike">
+              <a:latin typeface="Arial"/>
+            </a:endParaRPr>
+          </a:p>
+        </p:txBody>
+      </p:sp>
+      <p:sp>
+        <p:nvSpPr>
+          <p:cNvPr id="46" name=""/>
+          <p:cNvSpPr/>
+          <p:nvPr/>
+        </p:nvSpPr>
+        <p:spPr>
+          <a:xfrm>
+            <a:off x="258840" y="4763520"/>
+            <a:ext cx="3781440" cy="345960"/>
+          </a:xfrm>
+          <a:prstGeom prst="rect">
+            <a:avLst/>
+          </a:prstGeom>
+          <a:noFill/>
+          <a:ln w="0">
+            <a:noFill/>
+          </a:ln>
+        </p:spPr>
+        <p:style>
+          <a:lnRef idx="0"/>
+          <a:fillRef idx="0"/>
+          <a:effectRef idx="0"/>
+          <a:fontRef idx="minor"/>
+        </p:style>
+        <p:txBody>
+          <a:bodyPr lIns="90000" rIns="90000" tIns="45000" bIns="45000" anchor="t">
+            <a:noAutofit/>
+          </a:bodyPr>
+          <a:p>
+            <a:pPr>
+              <a:lnSpc>
+                <a:spcPct val="100000"/>
+              </a:lnSpc>
+              <a:buNone/>
+            </a:pPr>
             <a:r>
               <a:rPr b="0" lang="en-US" sz="1600" spc="-1" strike="noStrike">
                 <a:latin typeface="Arial"/>
               </a:rPr>
-              <a:t>Split cells into training/testing groups</a:t>
-            </a:r>
-            <a:endParaRPr b="0" lang="en-US" sz="1600" spc="-1" strike="noStrike">
-              <a:latin typeface="Arial"/>
-            </a:endParaRPr>
-          </a:p>
-        </p:txBody>
-      </p:sp>
-      <p:sp>
-        <p:nvSpPr>
-          <p:cNvPr id="46" name=""/>
-          <p:cNvSpPr txBox="1"/>
-          <p:nvPr/>
-        </p:nvSpPr>
-        <p:spPr>
-          <a:xfrm>
-            <a:off x="258840" y="4367520"/>
-            <a:ext cx="3781800" cy="346320"/>
-          </a:xfrm>
-          <a:prstGeom prst="rect">
-            <a:avLst/>
-          </a:prstGeom>
-          <a:noFill/>
-          <a:ln w="0">
-            <a:noFill/>
-          </a:ln>
-        </p:spPr>
-        <p:txBody>
-          <a:bodyPr lIns="90000" rIns="90000" tIns="45000" bIns="45000" anchor="t">
-            <a:noAutofit/>
-          </a:bodyPr>
-          <a:p>
-            <a:r>
-              <a:rPr b="0" lang="en-US" sz="1800" spc="-1" strike="noStrike">
-                <a:latin typeface="Arial"/>
-              </a:rPr>
               <a:t>3. </a:t>
             </a:r>
             <a:r>
-              <a:rPr b="0" lang="en-US" sz="1800" spc="-1" strike="noStrike" u="sng">
+              <a:rPr b="0" lang="en-US" sz="1600" spc="-1" strike="noStrike" u="sng">
                 <a:uFillTx/>
                 <a:latin typeface="Arial"/>
               </a:rPr>
               <a:t>Predict archiving-competent cells</a:t>
             </a:r>
-            <a:endParaRPr b="0" lang="en-US" sz="1800" spc="-1" strike="noStrike">
+            <a:endParaRPr b="0" lang="en-US" sz="1600" spc="-1" strike="noStrike">
               <a:latin typeface="Arial"/>
             </a:endParaRPr>
           </a:p>
@@ -2955,45 +2961,63 @@
       <p:sp>
         <p:nvSpPr>
           <p:cNvPr id="47" name=""/>
-          <p:cNvSpPr txBox="1"/>
+          <p:cNvSpPr/>
           <p:nvPr/>
         </p:nvSpPr>
         <p:spPr>
           <a:xfrm>
-            <a:off x="501120" y="3668400"/>
-            <a:ext cx="1942560" cy="541800"/>
-          </a:xfrm>
-          <a:prstGeom prst="rect">
-            <a:avLst/>
-          </a:prstGeom>
-          <a:noFill/>
-          <a:ln w="0">
-            <a:noFill/>
-          </a:ln>
-        </p:spPr>
+            <a:off x="501120" y="4100400"/>
+            <a:ext cx="1942200" cy="541440"/>
+          </a:xfrm>
+          <a:prstGeom prst="rect">
+            <a:avLst/>
+          </a:prstGeom>
+          <a:noFill/>
+          <a:ln w="0">
+            <a:noFill/>
+          </a:ln>
+        </p:spPr>
+        <p:style>
+          <a:lnRef idx="0"/>
+          <a:fillRef idx="0"/>
+          <a:effectRef idx="0"/>
+          <a:fontRef idx="minor"/>
+        </p:style>
         <p:txBody>
           <a:bodyPr lIns="90000" rIns="90000" tIns="45000" bIns="45000" anchor="t">
             <a:noAutofit/>
           </a:bodyPr>
           <a:p>
-            <a:r>
-              <a:rPr b="0" lang="en-US" sz="1600" spc="-1" strike="noStrike">
+            <a:pPr>
+              <a:lnSpc>
+                <a:spcPct val="100000"/>
+              </a:lnSpc>
+              <a:buNone/>
+            </a:pPr>
+            <a:r>
+              <a:rPr b="0" lang="en-US" sz="1400" spc="-1" strike="noStrike">
                 <a:latin typeface="Arial"/>
               </a:rPr>
               <a:t>Train random forest</a:t>
             </a:r>
-            <a:endParaRPr b="0" lang="en-US" sz="1600" spc="-1" strike="noStrike">
-              <a:latin typeface="Arial"/>
-            </a:endParaRPr>
-          </a:p>
-          <a:p>
-            <a:r>
-              <a:rPr b="0" lang="en-US" sz="1600" spc="-1" strike="noStrike">
+            <a:endParaRPr b="0" lang="en-US" sz="1400" spc="-1" strike="noStrike">
+              <a:latin typeface="Arial"/>
+            </a:endParaRPr>
+          </a:p>
+          <a:p>
+            <a:pPr>
+              <a:lnSpc>
+                <a:spcPct val="100000"/>
+              </a:lnSpc>
+              <a:buNone/>
+            </a:pPr>
+            <a:r>
+              <a:rPr b="0" lang="en-US" sz="1400" spc="-1" strike="noStrike">
                 <a:latin typeface="Arial"/>
               </a:rPr>
               <a:t>classifier</a:t>
             </a:r>
-            <a:endParaRPr b="0" lang="en-US" sz="1600" spc="-1" strike="noStrike">
+            <a:endParaRPr b="0" lang="en-US" sz="1400" spc="-1" strike="noStrike">
               <a:latin typeface="Arial"/>
             </a:endParaRPr>
           </a:p>
@@ -3002,34 +3026,46 @@
       <p:sp>
         <p:nvSpPr>
           <p:cNvPr id="48" name=""/>
-          <p:cNvSpPr txBox="1"/>
+          <p:cNvSpPr/>
           <p:nvPr/>
         </p:nvSpPr>
         <p:spPr>
           <a:xfrm>
-            <a:off x="2770200" y="3668400"/>
-            <a:ext cx="1163880" cy="316080"/>
-          </a:xfrm>
-          <a:prstGeom prst="rect">
-            <a:avLst/>
-          </a:prstGeom>
-          <a:noFill/>
-          <a:ln w="0">
-            <a:noFill/>
-          </a:ln>
-        </p:spPr>
+            <a:off x="2518200" y="4100400"/>
+            <a:ext cx="1163520" cy="315720"/>
+          </a:xfrm>
+          <a:prstGeom prst="rect">
+            <a:avLst/>
+          </a:prstGeom>
+          <a:noFill/>
+          <a:ln w="0">
+            <a:noFill/>
+          </a:ln>
+        </p:spPr>
+        <p:style>
+          <a:lnRef idx="0"/>
+          <a:fillRef idx="0"/>
+          <a:effectRef idx="0"/>
+          <a:fontRef idx="minor"/>
+        </p:style>
         <p:txBody>
           <a:bodyPr lIns="90000" rIns="90000" tIns="45000" bIns="45000" anchor="t">
             <a:noAutofit/>
           </a:bodyPr>
           <a:p>
-            <a:r>
-              <a:rPr b="0" lang="en-US" sz="1600" spc="-1" strike="noStrike">
+            <a:pPr>
+              <a:lnSpc>
+                <a:spcPct val="100000"/>
+              </a:lnSpc>
+              <a:buNone/>
+            </a:pPr>
+            <a:r>
+              <a:rPr b="0" lang="en-US" sz="1400" spc="-1" strike="noStrike">
                 <a:latin typeface="Arial"/>
               </a:rPr>
               <a:t>Test model</a:t>
             </a:r>
-            <a:endParaRPr b="0" lang="en-US" sz="1600" spc="-1" strike="noStrike">
+            <a:endParaRPr b="0" lang="en-US" sz="1400" spc="-1" strike="noStrike">
               <a:latin typeface="Arial"/>
             </a:endParaRPr>
           </a:p>
@@ -3043,13 +3079,13 @@
         </p:nvPicPr>
         <p:blipFill>
           <a:blip r:embed="rId3"/>
-          <a:srcRect l="3159" t="0" r="48888" b="91492"/>
+          <a:srcRect l="3159" t="0" r="48882" b="91482"/>
           <a:stretch/>
         </p:blipFill>
         <p:spPr>
           <a:xfrm>
-            <a:off x="3062880" y="842400"/>
-            <a:ext cx="2484720" cy="581400"/>
+            <a:off x="3117240" y="718560"/>
+            <a:ext cx="2484360" cy="581040"/>
           </a:xfrm>
           <a:prstGeom prst="rect">
             <a:avLst/>
@@ -3062,41 +3098,53 @@
       <p:sp>
         <p:nvSpPr>
           <p:cNvPr id="50" name=""/>
-          <p:cNvSpPr txBox="1"/>
+          <p:cNvSpPr/>
           <p:nvPr/>
         </p:nvSpPr>
         <p:spPr>
           <a:xfrm>
-            <a:off x="258840" y="2296800"/>
-            <a:ext cx="1630080" cy="346320"/>
-          </a:xfrm>
-          <a:prstGeom prst="rect">
-            <a:avLst/>
-          </a:prstGeom>
-          <a:noFill/>
-          <a:ln w="0">
-            <a:noFill/>
-          </a:ln>
-        </p:spPr>
+            <a:off x="258840" y="3016800"/>
+            <a:ext cx="1629720" cy="345960"/>
+          </a:xfrm>
+          <a:prstGeom prst="rect">
+            <a:avLst/>
+          </a:prstGeom>
+          <a:noFill/>
+          <a:ln w="0">
+            <a:noFill/>
+          </a:ln>
+        </p:spPr>
+        <p:style>
+          <a:lnRef idx="0"/>
+          <a:fillRef idx="0"/>
+          <a:effectRef idx="0"/>
+          <a:fontRef idx="minor"/>
+        </p:style>
         <p:txBody>
           <a:bodyPr lIns="90000" rIns="90000" tIns="45000" bIns="45000" anchor="t">
             <a:noAutofit/>
           </a:bodyPr>
           <a:p>
-            <a:r>
-              <a:rPr b="0" lang="en-US" sz="1800" spc="-1" strike="noStrike">
+            <a:pPr>
+              <a:lnSpc>
+                <a:spcPct val="100000"/>
+              </a:lnSpc>
+              <a:buNone/>
+            </a:pPr>
+            <a:r>
+              <a:rPr b="0" lang="en-US" sz="1600" spc="-1" strike="noStrike">
                 <a:latin typeface="Arial"/>
               </a:rPr>
               <a:t>2. </a:t>
             </a:r>
             <a:r>
-              <a:rPr b="0" lang="en-US" sz="1800" spc="-1" strike="noStrike" u="sng">
+              <a:rPr b="0" lang="en-US" sz="1600" spc="-1" strike="noStrike" u="sng">
                 <a:uFillTx/>
                 <a:latin typeface="Arial"/>
               </a:rPr>
               <a:t>Train model</a:t>
             </a:r>
-            <a:endParaRPr b="0" lang="en-US" sz="1800" spc="-1" strike="noStrike">
+            <a:endParaRPr b="0" lang="en-US" sz="1600" spc="-1" strike="noStrike">
               <a:latin typeface="Arial"/>
             </a:endParaRPr>
           </a:p>
@@ -3105,28 +3153,37 @@
       <p:sp>
         <p:nvSpPr>
           <p:cNvPr id="51" name=""/>
-          <p:cNvSpPr txBox="1"/>
+          <p:cNvSpPr/>
           <p:nvPr/>
         </p:nvSpPr>
         <p:spPr>
           <a:xfrm>
-            <a:off x="501120" y="4656600"/>
-            <a:ext cx="5080320" cy="767520"/>
-          </a:xfrm>
-          <a:prstGeom prst="rect">
-            <a:avLst/>
-          </a:prstGeom>
-          <a:noFill/>
-          <a:ln w="0">
-            <a:noFill/>
-          </a:ln>
-        </p:spPr>
+            <a:off x="501120" y="5052600"/>
+            <a:ext cx="5079960" cy="767160"/>
+          </a:xfrm>
+          <a:prstGeom prst="rect">
+            <a:avLst/>
+          </a:prstGeom>
+          <a:noFill/>
+          <a:ln w="0">
+            <a:noFill/>
+          </a:ln>
+        </p:spPr>
+        <p:style>
+          <a:lnRef idx="0"/>
+          <a:fillRef idx="0"/>
+          <a:effectRef idx="0"/>
+          <a:fontRef idx="minor"/>
+        </p:style>
         <p:txBody>
           <a:bodyPr lIns="90000" rIns="90000" tIns="45000" bIns="45000" anchor="t">
             <a:noAutofit/>
           </a:bodyPr>
           <a:p>
             <a:pPr marL="137160" indent="-137160">
+              <a:lnSpc>
+                <a:spcPct val="100000"/>
+              </a:lnSpc>
               <a:buClr>
                 <a:srgbClr val="000000"/>
               </a:buClr>
@@ -3135,17 +3192,20 @@
               <a:buChar char=""/>
             </a:pPr>
             <a:r>
-              <a:rPr b="0" lang="en-US" sz="1600" spc="-1" strike="noStrike">
+              <a:rPr b="0" lang="en-US" sz="1400" spc="-1" strike="noStrike">
                 <a:latin typeface="Arial"/>
               </a:rPr>
-              <a:t>Datasets that did not receive an Ag-tag</a:t>
-            </a:r>
-            <a:endParaRPr b="0" lang="en-US" sz="1600" spc="-1" strike="noStrike">
+              <a:t>Predict treatments/perturbations that impair archiving</a:t>
+            </a:r>
+            <a:endParaRPr b="0" lang="en-US" sz="1400" spc="-1" strike="noStrike">
               <a:latin typeface="Arial"/>
             </a:endParaRPr>
           </a:p>
           <a:p>
             <a:pPr marL="137160" indent="-137160">
+              <a:lnSpc>
+                <a:spcPct val="100000"/>
+              </a:lnSpc>
               <a:buClr>
                 <a:srgbClr val="000000"/>
               </a:buClr>
@@ -3154,17 +3214,159 @@
               <a:buChar char=""/>
             </a:pPr>
             <a:r>
-              <a:rPr b="0" lang="en-US" sz="1600" spc="-1" strike="noStrike">
+              <a:rPr b="0" lang="en-US" sz="1400" spc="-1" strike="noStrike">
                 <a:latin typeface="Arial"/>
               </a:rPr>
-              <a:t>Predict treatments/perturbations that impair archiving</a:t>
-            </a:r>
-            <a:endParaRPr b="0" lang="en-US" sz="1600" spc="-1" strike="noStrike">
-              <a:latin typeface="Arial"/>
-            </a:endParaRPr>
-          </a:p>
+              <a:t>Design new experiments and verify</a:t>
+            </a:r>
+            <a:endParaRPr b="0" lang="en-US" sz="1400" spc="-1" strike="noStrike">
+              <a:latin typeface="Arial"/>
+            </a:endParaRPr>
+          </a:p>
+        </p:txBody>
+      </p:sp>
+      <p:sp>
+        <p:nvSpPr>
+          <p:cNvPr id="52" name=""/>
+          <p:cNvSpPr/>
+          <p:nvPr/>
+        </p:nvSpPr>
+        <p:spPr>
+          <a:xfrm flipV="1">
+            <a:off x="1600200" y="3702600"/>
+            <a:ext cx="457200" cy="446400"/>
+          </a:xfrm>
+          <a:prstGeom prst="line">
+            <a:avLst/>
+          </a:prstGeom>
+          <a:ln w="54720">
+            <a:solidFill>
+              <a:srgbClr val="000000"/>
+            </a:solidFill>
+            <a:round/>
+            <a:headEnd len="med" type="triangle" w="med"/>
+          </a:ln>
+        </p:spPr>
+        <p:style>
+          <a:lnRef idx="0"/>
+          <a:fillRef idx="0"/>
+          <a:effectRef idx="0"/>
+          <a:fontRef idx="minor"/>
+        </p:style>
+      </p:sp>
+      <p:sp>
+        <p:nvSpPr>
+          <p:cNvPr id="53" name=""/>
+          <p:cNvSpPr/>
+          <p:nvPr/>
+        </p:nvSpPr>
+        <p:spPr>
+          <a:xfrm flipH="1" flipV="1">
+            <a:off x="2286000" y="3702600"/>
+            <a:ext cx="457200" cy="446400"/>
+          </a:xfrm>
+          <a:prstGeom prst="line">
+            <a:avLst/>
+          </a:prstGeom>
+          <a:ln w="54720">
+            <a:solidFill>
+              <a:srgbClr val="000000"/>
+            </a:solidFill>
+            <a:round/>
+            <a:headEnd len="med" type="triangle" w="med"/>
+          </a:ln>
+        </p:spPr>
+        <p:style>
+          <a:lnRef idx="0"/>
+          <a:fillRef idx="0"/>
+          <a:effectRef idx="0"/>
+          <a:fontRef idx="minor"/>
+        </p:style>
+      </p:sp>
+      <p:sp>
+        <p:nvSpPr>
+          <p:cNvPr id="54" name=""/>
+          <p:cNvSpPr/>
+          <p:nvPr/>
+        </p:nvSpPr>
+        <p:spPr>
+          <a:xfrm>
+            <a:off x="3511080" y="679680"/>
+            <a:ext cx="1769760" cy="260640"/>
+          </a:xfrm>
+          <a:prstGeom prst="rect">
+            <a:avLst/>
+          </a:prstGeom>
+          <a:solidFill>
+            <a:srgbClr val="ffffff"/>
+          </a:solidFill>
+          <a:ln w="0">
+            <a:noFill/>
+          </a:ln>
+        </p:spPr>
+        <p:style>
+          <a:lnRef idx="0"/>
+          <a:fillRef idx="0"/>
+          <a:effectRef idx="0"/>
+          <a:fontRef idx="minor"/>
+        </p:style>
+        <p:txBody>
+          <a:bodyPr lIns="90000" rIns="90000" tIns="45000" bIns="45000" anchor="t">
+            <a:noAutofit/>
+          </a:bodyPr>
+          <a:p>
+            <a:pPr>
+              <a:lnSpc>
+                <a:spcPct val="100000"/>
+              </a:lnSpc>
+              <a:buNone/>
+            </a:pPr>
+            <a:r>
+              <a:rPr b="0" lang="en-US" sz="1200" spc="-1" strike="noStrike">
+                <a:latin typeface="Arial"/>
+              </a:rPr>
+              <a:t>Antigen-DNA conjugate</a:t>
+            </a:r>
+            <a:endParaRPr b="0" lang="en-US" sz="1200" spc="-1" strike="noStrike">
+              <a:latin typeface="Arial"/>
+            </a:endParaRPr>
+          </a:p>
+        </p:txBody>
+      </p:sp>
+      <p:sp>
+        <p:nvSpPr>
+          <p:cNvPr id="55" name=""/>
+          <p:cNvSpPr/>
+          <p:nvPr/>
+        </p:nvSpPr>
+        <p:spPr>
+          <a:xfrm>
+            <a:off x="501480" y="2128680"/>
+            <a:ext cx="2927160" cy="992880"/>
+          </a:xfrm>
+          <a:prstGeom prst="rect">
+            <a:avLst/>
+          </a:prstGeom>
+          <a:noFill/>
+          <a:ln w="0">
+            <a:noFill/>
+          </a:ln>
+        </p:spPr>
+        <p:style>
+          <a:lnRef idx="0"/>
+          <a:fillRef idx="0"/>
+          <a:effectRef idx="0"/>
+          <a:fontRef idx="minor"/>
+        </p:style>
+        <p:txBody>
+          <a:bodyPr lIns="90000" rIns="90000" tIns="45000" bIns="45000" anchor="t">
+            <a:noAutofit/>
+          </a:bodyPr>
           <a:p>
             <a:pPr marL="137160" indent="-137160">
+              <a:lnSpc>
+                <a:spcPct val="100000"/>
+              </a:lnSpc>
               <a:buClr>
                 <a:srgbClr val="000000"/>
               </a:buClr>
@@ -3173,37 +3375,78 @@
               <a:buChar char=""/>
             </a:pPr>
             <a:r>
-              <a:rPr b="0" lang="en-US" sz="1600" spc="-1" strike="noStrike">
+              <a:rPr b="0" lang="en-US" sz="1400" spc="-1" strike="noStrike">
                 <a:latin typeface="Arial"/>
               </a:rPr>
-              <a:t>Design new experiments and verify</a:t>
-            </a:r>
-            <a:endParaRPr b="0" lang="en-US" sz="1600" spc="-1" strike="noStrike">
-              <a:latin typeface="Arial"/>
-            </a:endParaRPr>
-          </a:p>
-        </p:txBody>
-      </p:sp>
-      <p:sp>
-        <p:nvSpPr>
-          <p:cNvPr id="52" name=""/>
+              <a:t>Inject mouse with Ag-tag</a:t>
+            </a:r>
+            <a:endParaRPr b="0" lang="en-US" sz="1400" spc="-1" strike="noStrike">
+              <a:latin typeface="Arial"/>
+            </a:endParaRPr>
+          </a:p>
+          <a:p>
+            <a:pPr marL="137160" indent="-137160">
+              <a:lnSpc>
+                <a:spcPct val="100000"/>
+              </a:lnSpc>
+              <a:buClr>
+                <a:srgbClr val="000000"/>
+              </a:buClr>
+              <a:buSzPct val="45000"/>
+              <a:buFont typeface="Wingdings" charset="2"/>
+              <a:buChar char=""/>
+            </a:pPr>
+            <a:r>
+              <a:rPr b="0" lang="en-US" sz="1400" spc="-1" strike="noStrike">
+                <a:latin typeface="Arial"/>
+              </a:rPr>
+              <a:t>Harvest draining lymph node</a:t>
+            </a:r>
+            <a:endParaRPr b="0" lang="en-US" sz="1400" spc="-1" strike="noStrike">
+              <a:latin typeface="Arial"/>
+            </a:endParaRPr>
+          </a:p>
+          <a:p>
+            <a:pPr marL="137160" indent="-137160">
+              <a:lnSpc>
+                <a:spcPct val="100000"/>
+              </a:lnSpc>
+              <a:buClr>
+                <a:srgbClr val="000000"/>
+              </a:buClr>
+              <a:buSzPct val="45000"/>
+              <a:buFont typeface="Wingdings" charset="2"/>
+              <a:buChar char=""/>
+            </a:pPr>
+            <a:r>
+              <a:rPr b="0" lang="en-US" sz="1400" spc="-1" strike="noStrike">
+                <a:latin typeface="Arial"/>
+              </a:rPr>
+              <a:t>Perform scRNA-seq</a:t>
+            </a:r>
+            <a:endParaRPr b="0" lang="en-US" sz="1400" spc="-1" strike="noStrike">
+              <a:latin typeface="Arial"/>
+            </a:endParaRPr>
+          </a:p>
+        </p:txBody>
+      </p:sp>
+      <p:sp>
+        <p:nvSpPr>
+          <p:cNvPr id="56" name=""/>
           <p:cNvSpPr/>
           <p:nvPr/>
         </p:nvSpPr>
         <p:spPr>
-          <a:xfrm flipV="1">
-            <a:off x="1371600" y="2982600"/>
-            <a:ext cx="685800" cy="685800"/>
-          </a:xfrm>
-          <a:prstGeom prst="line">
-            <a:avLst/>
-          </a:prstGeom>
-          <a:ln w="54720">
-            <a:solidFill>
-              <a:srgbClr val="000000"/>
-            </a:solidFill>
-            <a:round/>
-            <a:headEnd len="med" type="triangle" w="med"/>
+          <a:xfrm>
+            <a:off x="5421600" y="598320"/>
+            <a:ext cx="293040" cy="315720"/>
+          </a:xfrm>
+          <a:prstGeom prst="rect">
+            <a:avLst/>
+          </a:prstGeom>
+          <a:noFill/>
+          <a:ln w="0">
+            <a:noFill/>
           </a:ln>
         </p:spPr>
         <p:style>
@@ -3212,27 +3455,46 @@
           <a:effectRef idx="0"/>
           <a:fontRef idx="minor"/>
         </p:style>
-      </p:sp>
-      <p:sp>
-        <p:nvSpPr>
-          <p:cNvPr id="53" name=""/>
+        <p:txBody>
+          <a:bodyPr lIns="90000" rIns="90000" tIns="45000" bIns="45000" anchor="t">
+            <a:noAutofit/>
+          </a:bodyPr>
+          <a:p>
+            <a:pPr>
+              <a:lnSpc>
+                <a:spcPct val="100000"/>
+              </a:lnSpc>
+              <a:buNone/>
+            </a:pPr>
+            <a:r>
+              <a:rPr b="1" lang="en-US" sz="1600" spc="-1" strike="noStrike">
+                <a:latin typeface="Arial"/>
+              </a:rPr>
+              <a:t>a</a:t>
+            </a:r>
+            <a:endParaRPr b="0" lang="en-US" sz="1600" spc="-1" strike="noStrike">
+              <a:latin typeface="Arial"/>
+            </a:endParaRPr>
+          </a:p>
+        </p:txBody>
+      </p:sp>
+      <p:sp>
+        <p:nvSpPr>
+          <p:cNvPr id="57" name=""/>
           <p:cNvSpPr/>
           <p:nvPr/>
         </p:nvSpPr>
         <p:spPr>
-          <a:xfrm flipH="1" flipV="1">
-            <a:off x="2286000" y="2982600"/>
-            <a:ext cx="685800" cy="685800"/>
-          </a:xfrm>
-          <a:prstGeom prst="line">
-            <a:avLst/>
-          </a:prstGeom>
-          <a:ln w="54720">
-            <a:solidFill>
-              <a:srgbClr val="000000"/>
-            </a:solidFill>
-            <a:round/>
-            <a:headEnd len="med" type="triangle" w="med"/>
+          <a:xfrm>
+            <a:off x="7543800" y="598320"/>
+            <a:ext cx="303840" cy="315720"/>
+          </a:xfrm>
+          <a:prstGeom prst="rect">
+            <a:avLst/>
+          </a:prstGeom>
+          <a:noFill/>
+          <a:ln w="0">
+            <a:noFill/>
           </a:ln>
         </p:spPr>
         <p:style>
@@ -3241,194 +3503,24 @@
           <a:effectRef idx="0"/>
           <a:fontRef idx="minor"/>
         </p:style>
-      </p:sp>
-      <p:sp>
-        <p:nvSpPr>
-          <p:cNvPr id="54" name=""/>
-          <p:cNvSpPr txBox="1"/>
-          <p:nvPr/>
-        </p:nvSpPr>
-        <p:spPr>
-          <a:xfrm>
-            <a:off x="3456720" y="803520"/>
-            <a:ext cx="1770120" cy="261000"/>
-          </a:xfrm>
-          <a:prstGeom prst="rect">
-            <a:avLst/>
-          </a:prstGeom>
-          <a:solidFill>
-            <a:srgbClr val="ffffff"/>
-          </a:solidFill>
-          <a:ln w="0">
-            <a:noFill/>
-          </a:ln>
-        </p:spPr>
         <p:txBody>
           <a:bodyPr lIns="90000" rIns="90000" tIns="45000" bIns="45000" anchor="t">
             <a:noAutofit/>
           </a:bodyPr>
           <a:p>
-            <a:r>
-              <a:rPr b="0" lang="en-US" sz="1200" spc="-1" strike="noStrike">
-                <a:latin typeface="Arial"/>
-              </a:rPr>
-              <a:t>Antigen-DNA conjugate</a:t>
-            </a:r>
-            <a:endParaRPr b="0" lang="en-US" sz="1200" spc="-1" strike="noStrike">
-              <a:latin typeface="Arial"/>
-            </a:endParaRPr>
-          </a:p>
-        </p:txBody>
-      </p:sp>
-      <p:sp>
-        <p:nvSpPr>
-          <p:cNvPr id="55" name=""/>
-          <p:cNvSpPr txBox="1"/>
-          <p:nvPr/>
-        </p:nvSpPr>
-        <p:spPr>
-          <a:xfrm>
-            <a:off x="501480" y="1408680"/>
-            <a:ext cx="2927520" cy="993240"/>
-          </a:xfrm>
-          <a:prstGeom prst="rect">
-            <a:avLst/>
-          </a:prstGeom>
-          <a:noFill/>
-          <a:ln w="0">
-            <a:noFill/>
-          </a:ln>
-        </p:spPr>
-        <p:txBody>
-          <a:bodyPr lIns="90000" rIns="90000" tIns="45000" bIns="45000" anchor="t">
-            <a:noAutofit/>
-          </a:bodyPr>
-          <a:p>
-            <a:pPr marL="137160" indent="-137160">
-              <a:buClr>
-                <a:srgbClr val="000000"/>
-              </a:buClr>
-              <a:buSzPct val="45000"/>
-              <a:buFont typeface="Wingdings" charset="2"/>
-              <a:buChar char=""/>
-            </a:pPr>
-            <a:r>
-              <a:rPr b="0" lang="en-US" sz="1600" spc="-1" strike="noStrike">
-                <a:latin typeface="Arial"/>
-              </a:rPr>
-              <a:t>Inject mouse with Ag-tag</a:t>
-            </a:r>
-            <a:endParaRPr b="0" lang="en-US" sz="1600" spc="-1" strike="noStrike">
-              <a:latin typeface="Arial"/>
-            </a:endParaRPr>
-          </a:p>
-          <a:p>
-            <a:pPr marL="137160" indent="-137160">
-              <a:buClr>
-                <a:srgbClr val="000000"/>
-              </a:buClr>
-              <a:buSzPct val="45000"/>
-              <a:buFont typeface="Wingdings" charset="2"/>
-              <a:buChar char=""/>
-            </a:pPr>
-            <a:r>
-              <a:rPr b="0" lang="en-US" sz="1600" spc="-1" strike="noStrike">
-                <a:latin typeface="Arial"/>
-              </a:rPr>
-              <a:t>Harvest draining lymph node</a:t>
-            </a:r>
-            <a:endParaRPr b="0" lang="en-US" sz="1600" spc="-1" strike="noStrike">
-              <a:latin typeface="Arial"/>
-            </a:endParaRPr>
-          </a:p>
-          <a:p>
-            <a:pPr marL="137160" indent="-137160">
-              <a:buClr>
-                <a:srgbClr val="000000"/>
-              </a:buClr>
-              <a:buSzPct val="45000"/>
-              <a:buFont typeface="Wingdings" charset="2"/>
-              <a:buChar char=""/>
-            </a:pPr>
-            <a:r>
-              <a:rPr b="0" lang="en-US" sz="1600" spc="-1" strike="noStrike">
-                <a:latin typeface="Arial"/>
-              </a:rPr>
-              <a:t>Perform scRNA-seq</a:t>
-            </a:r>
-            <a:endParaRPr b="0" lang="en-US" sz="1600" spc="-1" strike="noStrike">
-              <a:latin typeface="Arial"/>
-            </a:endParaRPr>
-          </a:p>
-        </p:txBody>
-      </p:sp>
-      <p:sp>
-        <p:nvSpPr>
-          <p:cNvPr id="56" name=""/>
-          <p:cNvSpPr txBox="1"/>
-          <p:nvPr/>
-        </p:nvSpPr>
-        <p:spPr>
-          <a:xfrm>
-            <a:off x="5421600" y="598320"/>
-            <a:ext cx="293400" cy="316080"/>
-          </a:xfrm>
-          <a:prstGeom prst="rect">
-            <a:avLst/>
-          </a:prstGeom>
-          <a:noFill/>
-          <a:ln w="0">
-            <a:noFill/>
-          </a:ln>
-        </p:spPr>
-        <p:txBody>
-          <a:bodyPr lIns="90000" rIns="90000" tIns="45000" bIns="45000" anchor="t">
-            <a:noAutofit/>
-          </a:bodyPr>
-          <a:p>
-            <a:r>
-              <a:rPr b="1" lang="en-US" sz="1600" spc="-1" strike="noStrike">
-                <a:latin typeface="Arial"/>
-              </a:rPr>
-              <a:t>a</a:t>
-            </a:r>
-            <a:endParaRPr b="1" lang="en-US" sz="1600" spc="-1" strike="noStrike">
-              <a:latin typeface="Arial"/>
-            </a:endParaRPr>
-          </a:p>
-        </p:txBody>
-      </p:sp>
-      <p:sp>
-        <p:nvSpPr>
-          <p:cNvPr id="57" name=""/>
-          <p:cNvSpPr txBox="1"/>
-          <p:nvPr/>
-        </p:nvSpPr>
-        <p:spPr>
-          <a:xfrm>
-            <a:off x="7543800" y="598320"/>
-            <a:ext cx="304200" cy="316080"/>
-          </a:xfrm>
-          <a:prstGeom prst="rect">
-            <a:avLst/>
-          </a:prstGeom>
-          <a:noFill/>
-          <a:ln w="0">
-            <a:noFill/>
-          </a:ln>
-        </p:spPr>
-        <p:txBody>
-          <a:bodyPr lIns="90000" rIns="90000" tIns="45000" bIns="45000" anchor="t">
-            <a:noAutofit/>
-          </a:bodyPr>
-          <a:p>
+            <a:pPr>
+              <a:lnSpc>
+                <a:spcPct val="100000"/>
+              </a:lnSpc>
+              <a:buNone/>
+            </a:pPr>
             <a:r>
               <a:rPr b="1" lang="en-US" sz="1600" spc="-1" strike="noStrike">
                 <a:latin typeface="Arial"/>
               </a:rPr>
               <a:t>b</a:t>
             </a:r>
-            <a:endParaRPr b="1" lang="en-US" sz="1600" spc="-1" strike="noStrike">
+            <a:endParaRPr b="0" lang="en-US" sz="1600" spc="-1" strike="noStrike">
               <a:latin typeface="Arial"/>
             </a:endParaRPr>
           </a:p>
@@ -3437,34 +3529,46 @@
       <p:sp>
         <p:nvSpPr>
           <p:cNvPr id="58" name=""/>
-          <p:cNvSpPr txBox="1"/>
+          <p:cNvSpPr/>
           <p:nvPr/>
         </p:nvSpPr>
         <p:spPr>
           <a:xfrm>
             <a:off x="5421600" y="2427120"/>
-            <a:ext cx="293400" cy="316080"/>
-          </a:xfrm>
-          <a:prstGeom prst="rect">
-            <a:avLst/>
-          </a:prstGeom>
-          <a:noFill/>
-          <a:ln w="0">
-            <a:noFill/>
-          </a:ln>
-        </p:spPr>
+            <a:ext cx="293400" cy="315720"/>
+          </a:xfrm>
+          <a:prstGeom prst="rect">
+            <a:avLst/>
+          </a:prstGeom>
+          <a:noFill/>
+          <a:ln w="0">
+            <a:noFill/>
+          </a:ln>
+        </p:spPr>
+        <p:style>
+          <a:lnRef idx="0"/>
+          <a:fillRef idx="0"/>
+          <a:effectRef idx="0"/>
+          <a:fontRef idx="minor"/>
+        </p:style>
         <p:txBody>
           <a:bodyPr lIns="90000" rIns="90000" tIns="45000" bIns="45000" anchor="t">
             <a:noAutofit/>
           </a:bodyPr>
           <a:p>
+            <a:pPr>
+              <a:lnSpc>
+                <a:spcPct val="100000"/>
+              </a:lnSpc>
+              <a:buNone/>
+            </a:pPr>
             <a:r>
               <a:rPr b="1" lang="en-US" sz="1600" spc="-1" strike="noStrike">
                 <a:latin typeface="Arial"/>
               </a:rPr>
               <a:t>c</a:t>
             </a:r>
-            <a:endParaRPr b="1" lang="en-US" sz="1600" spc="-1" strike="noStrike">
+            <a:endParaRPr b="0" lang="en-US" sz="1600" spc="-1" strike="noStrike">
               <a:latin typeface="Arial"/>
             </a:endParaRPr>
           </a:p>
@@ -3473,34 +3577,46 @@
       <p:sp>
         <p:nvSpPr>
           <p:cNvPr id="59" name=""/>
-          <p:cNvSpPr txBox="1"/>
+          <p:cNvSpPr/>
           <p:nvPr/>
         </p:nvSpPr>
         <p:spPr>
           <a:xfrm>
             <a:off x="7543800" y="2427120"/>
-            <a:ext cx="304200" cy="316080"/>
-          </a:xfrm>
-          <a:prstGeom prst="rect">
-            <a:avLst/>
-          </a:prstGeom>
-          <a:noFill/>
-          <a:ln w="0">
-            <a:noFill/>
-          </a:ln>
-        </p:spPr>
+            <a:ext cx="303840" cy="315720"/>
+          </a:xfrm>
+          <a:prstGeom prst="rect">
+            <a:avLst/>
+          </a:prstGeom>
+          <a:noFill/>
+          <a:ln w="0">
+            <a:noFill/>
+          </a:ln>
+        </p:spPr>
+        <p:style>
+          <a:lnRef idx="0"/>
+          <a:fillRef idx="0"/>
+          <a:effectRef idx="0"/>
+          <a:fontRef idx="minor"/>
+        </p:style>
         <p:txBody>
           <a:bodyPr lIns="90000" rIns="90000" tIns="45000" bIns="45000" anchor="t">
             <a:noAutofit/>
           </a:bodyPr>
           <a:p>
+            <a:pPr>
+              <a:lnSpc>
+                <a:spcPct val="100000"/>
+              </a:lnSpc>
+              <a:buNone/>
+            </a:pPr>
             <a:r>
               <a:rPr b="1" lang="en-US" sz="1600" spc="-1" strike="noStrike">
                 <a:latin typeface="Arial"/>
               </a:rPr>
               <a:t>d</a:t>
             </a:r>
-            <a:endParaRPr b="1" lang="en-US" sz="1600" spc="-1" strike="noStrike">
+            <a:endParaRPr b="0" lang="en-US" sz="1600" spc="-1" strike="noStrike">
               <a:latin typeface="Arial"/>
             </a:endParaRPr>
           </a:p>
@@ -3509,34 +3625,46 @@
       <p:sp>
         <p:nvSpPr>
           <p:cNvPr id="60" name=""/>
-          <p:cNvSpPr txBox="1"/>
+          <p:cNvSpPr/>
           <p:nvPr/>
         </p:nvSpPr>
         <p:spPr>
           <a:xfrm>
             <a:off x="5421600" y="4114800"/>
-            <a:ext cx="293400" cy="316080"/>
-          </a:xfrm>
-          <a:prstGeom prst="rect">
-            <a:avLst/>
-          </a:prstGeom>
-          <a:noFill/>
-          <a:ln w="0">
-            <a:noFill/>
-          </a:ln>
-        </p:spPr>
+            <a:ext cx="293400" cy="315720"/>
+          </a:xfrm>
+          <a:prstGeom prst="rect">
+            <a:avLst/>
+          </a:prstGeom>
+          <a:noFill/>
+          <a:ln w="0">
+            <a:noFill/>
+          </a:ln>
+        </p:spPr>
+        <p:style>
+          <a:lnRef idx="0"/>
+          <a:fillRef idx="0"/>
+          <a:effectRef idx="0"/>
+          <a:fontRef idx="minor"/>
+        </p:style>
         <p:txBody>
           <a:bodyPr lIns="90000" rIns="90000" tIns="45000" bIns="45000" anchor="t">
             <a:noAutofit/>
           </a:bodyPr>
           <a:p>
+            <a:pPr>
+              <a:lnSpc>
+                <a:spcPct val="100000"/>
+              </a:lnSpc>
+              <a:buNone/>
+            </a:pPr>
             <a:r>
               <a:rPr b="1" lang="en-US" sz="1600" spc="-1" strike="noStrike">
                 <a:latin typeface="Arial"/>
               </a:rPr>
               <a:t>e</a:t>
             </a:r>
-            <a:endParaRPr b="1" lang="en-US" sz="1600" spc="-1" strike="noStrike">
+            <a:endParaRPr b="0" lang="en-US" sz="1600" spc="-1" strike="noStrike">
               <a:latin typeface="Arial"/>
             </a:endParaRPr>
           </a:p>
@@ -3545,34 +3673,177 @@
       <p:sp>
         <p:nvSpPr>
           <p:cNvPr id="61" name=""/>
-          <p:cNvSpPr txBox="1"/>
+          <p:cNvSpPr/>
           <p:nvPr/>
         </p:nvSpPr>
         <p:spPr>
           <a:xfrm>
             <a:off x="7543800" y="4114800"/>
-            <a:ext cx="247680" cy="316080"/>
-          </a:xfrm>
-          <a:prstGeom prst="rect">
-            <a:avLst/>
-          </a:prstGeom>
-          <a:noFill/>
-          <a:ln w="0">
-            <a:noFill/>
-          </a:ln>
-        </p:spPr>
+            <a:ext cx="247320" cy="315720"/>
+          </a:xfrm>
+          <a:prstGeom prst="rect">
+            <a:avLst/>
+          </a:prstGeom>
+          <a:noFill/>
+          <a:ln w="0">
+            <a:noFill/>
+          </a:ln>
+        </p:spPr>
+        <p:style>
+          <a:lnRef idx="0"/>
+          <a:fillRef idx="0"/>
+          <a:effectRef idx="0"/>
+          <a:fontRef idx="minor"/>
+        </p:style>
         <p:txBody>
           <a:bodyPr lIns="90000" rIns="90000" tIns="45000" bIns="45000" anchor="t">
             <a:noAutofit/>
           </a:bodyPr>
           <a:p>
+            <a:pPr>
+              <a:lnSpc>
+                <a:spcPct val="100000"/>
+              </a:lnSpc>
+              <a:buNone/>
+            </a:pPr>
             <a:r>
               <a:rPr b="1" lang="en-US" sz="1600" spc="-1" strike="noStrike">
                 <a:latin typeface="Arial"/>
               </a:rPr>
               <a:t>f</a:t>
             </a:r>
-            <a:endParaRPr b="1" lang="en-US" sz="1600" spc="-1" strike="noStrike">
+            <a:endParaRPr b="0" lang="en-US" sz="1600" spc="-1" strike="noStrike">
+              <a:latin typeface="Arial"/>
+            </a:endParaRPr>
+          </a:p>
+        </p:txBody>
+      </p:sp>
+      <p:sp>
+        <p:nvSpPr>
+          <p:cNvPr id="62" name=""/>
+          <p:cNvSpPr/>
+          <p:nvPr/>
+        </p:nvSpPr>
+        <p:spPr>
+          <a:xfrm>
+            <a:off x="482760" y="694800"/>
+            <a:ext cx="2525760" cy="345960"/>
+          </a:xfrm>
+          <a:prstGeom prst="rect">
+            <a:avLst/>
+          </a:prstGeom>
+          <a:noFill/>
+          <a:ln w="0">
+            <a:noFill/>
+          </a:ln>
+        </p:spPr>
+        <p:style>
+          <a:lnRef idx="0"/>
+          <a:fillRef idx="0"/>
+          <a:effectRef idx="0"/>
+          <a:fontRef idx="minor"/>
+        </p:style>
+        <p:txBody>
+          <a:bodyPr lIns="90000" rIns="90000" tIns="45000" bIns="45000" anchor="t">
+            <a:noAutofit/>
+          </a:bodyPr>
+          <a:p>
+            <a:pPr>
+              <a:lnSpc>
+                <a:spcPct val="100000"/>
+              </a:lnSpc>
+              <a:buNone/>
+            </a:pPr>
+            <a:r>
+              <a:rPr b="0" lang="en-US" sz="1600" spc="-1" strike="noStrike" u="sng">
+                <a:uFillTx/>
+                <a:latin typeface="Arial"/>
+              </a:rPr>
+              <a:t>Question</a:t>
+            </a:r>
+            <a:endParaRPr b="0" lang="en-US" sz="1600" spc="-1" strike="noStrike">
+              <a:latin typeface="Arial"/>
+            </a:endParaRPr>
+          </a:p>
+        </p:txBody>
+      </p:sp>
+      <p:sp>
+        <p:nvSpPr>
+          <p:cNvPr id="63" name=""/>
+          <p:cNvSpPr/>
+          <p:nvPr/>
+        </p:nvSpPr>
+        <p:spPr>
+          <a:xfrm>
+            <a:off x="482760" y="976680"/>
+            <a:ext cx="3996720" cy="992880"/>
+          </a:xfrm>
+          <a:prstGeom prst="rect">
+            <a:avLst/>
+          </a:prstGeom>
+          <a:noFill/>
+          <a:ln w="0">
+            <a:noFill/>
+          </a:ln>
+        </p:spPr>
+        <p:style>
+          <a:lnRef idx="0"/>
+          <a:fillRef idx="0"/>
+          <a:effectRef idx="0"/>
+          <a:fontRef idx="minor"/>
+        </p:style>
+        <p:txBody>
+          <a:bodyPr lIns="90000" rIns="90000" tIns="45000" bIns="45000" anchor="t">
+            <a:noAutofit/>
+          </a:bodyPr>
+          <a:p>
+            <a:pPr>
+              <a:lnSpc>
+                <a:spcPct val="100000"/>
+              </a:lnSpc>
+              <a:buNone/>
+            </a:pPr>
+            <a:r>
+              <a:rPr b="0" lang="en-US" sz="1400" spc="-1" strike="noStrike">
+                <a:latin typeface="Arial"/>
+              </a:rPr>
+              <a:t>Can we identify cells that</a:t>
+            </a:r>
+            <a:endParaRPr b="0" lang="en-US" sz="1400" spc="-1" strike="noStrike">
+              <a:latin typeface="Arial"/>
+            </a:endParaRPr>
+          </a:p>
+          <a:p>
+            <a:pPr>
+              <a:lnSpc>
+                <a:spcPct val="100000"/>
+              </a:lnSpc>
+              <a:buNone/>
+            </a:pPr>
+            <a:r>
+              <a:rPr b="0" lang="en-US" sz="1400" spc="-1" strike="noStrike">
+                <a:latin typeface="Arial"/>
+              </a:rPr>
+              <a:t>archive antigen for samples that</a:t>
+            </a:r>
+            <a:endParaRPr b="0" lang="en-US" sz="1400" spc="-1" strike="noStrike">
+              <a:latin typeface="Arial"/>
+            </a:endParaRPr>
+          </a:p>
+          <a:p>
+            <a:pPr>
+              <a:lnSpc>
+                <a:spcPct val="100000"/>
+              </a:lnSpc>
+              <a:buNone/>
+            </a:pPr>
+            <a:r>
+              <a:rPr b="0" lang="en-US" sz="1400" spc="-1" strike="noStrike">
+                <a:latin typeface="Arial"/>
+              </a:rPr>
+              <a:t>did not receive an Ag-tag?</a:t>
+            </a:r>
+            <a:endParaRPr b="0" lang="en-US" sz="1400" spc="-1" strike="noStrike">
               <a:latin typeface="Arial"/>
             </a:endParaRPr>
           </a:p>

</xml_diff>